<commit_message>
Update AS91883(1.7) & AS91884(1.8) Documentation.pptx
</commit_message>
<xml_diff>
--- a/AS91883(1.7) & AS91884(1.8) Documentation.pptx
+++ b/AS91883(1.7) & AS91884(1.8) Documentation.pptx
@@ -156,7 +156,7 @@
 <file path=ppt/revisionInfo.xml><?xml version="1.0" encoding="utf-8"?>
 <p1510:revInfo xmlns:a="http://schemas.openxmlformats.org/drawingml/2006/main" xmlns:r="http://schemas.openxmlformats.org/officeDocument/2006/relationships" xmlns:p1510="http://schemas.microsoft.com/office/powerpoint/2015/10/main">
   <p1510:revLst>
-    <p1510:client id="{F1BAABD6-565A-4B4D-9F14-502B1B8F4095}" v="51" dt="2022-05-25T02:15:48.478"/>
+    <p1510:client id="{F1BAABD6-565A-4B4D-9F14-502B1B8F4095}" v="53" dt="2022-05-25T23:48:25.491"/>
   </p1510:revLst>
 </p1510:revInfo>
 </file>
@@ -3220,7 +3220,7 @@
   <pc:docChgLst>
     <pc:chgData name="Molly Sankey" userId="944469c7-6883-451f-9b55-4524bc4915b3" providerId="ADAL" clId="{F1BAABD6-565A-4B4D-9F14-502B1B8F4095}"/>
     <pc:docChg chg="undo custSel addSld delSld modSld sldOrd">
-      <pc:chgData name="Molly Sankey" userId="944469c7-6883-451f-9b55-4524bc4915b3" providerId="ADAL" clId="{F1BAABD6-565A-4B4D-9F14-502B1B8F4095}" dt="2022-05-25T02:15:48.476" v="8124" actId="20577"/>
+      <pc:chgData name="Molly Sankey" userId="944469c7-6883-451f-9b55-4524bc4915b3" providerId="ADAL" clId="{F1BAABD6-565A-4B4D-9F14-502B1B8F4095}" dt="2022-05-25T23:57:56.036" v="8838" actId="1076"/>
       <pc:docMkLst>
         <pc:docMk/>
       </pc:docMkLst>
@@ -3400,7 +3400,7 @@
         </pc:cxnChg>
       </pc:sldChg>
       <pc:sldChg chg="modSp mod">
-        <pc:chgData name="Molly Sankey" userId="944469c7-6883-451f-9b55-4524bc4915b3" providerId="ADAL" clId="{F1BAABD6-565A-4B4D-9F14-502B1B8F4095}" dt="2022-05-25T02:15:48.476" v="8124" actId="20577"/>
+        <pc:chgData name="Molly Sankey" userId="944469c7-6883-451f-9b55-4524bc4915b3" providerId="ADAL" clId="{F1BAABD6-565A-4B4D-9F14-502B1B8F4095}" dt="2022-05-25T02:19:23.100" v="8212" actId="20577"/>
         <pc:sldMkLst>
           <pc:docMk/>
           <pc:sldMk cId="3838895173" sldId="258"/>
@@ -3414,7 +3414,7 @@
           </ac:spMkLst>
         </pc:spChg>
         <pc:spChg chg="mod">
-          <ac:chgData name="Molly Sankey" userId="944469c7-6883-451f-9b55-4524bc4915b3" providerId="ADAL" clId="{F1BAABD6-565A-4B4D-9F14-502B1B8F4095}" dt="2022-05-25T02:15:48.476" v="8124" actId="20577"/>
+          <ac:chgData name="Molly Sankey" userId="944469c7-6883-451f-9b55-4524bc4915b3" providerId="ADAL" clId="{F1BAABD6-565A-4B4D-9F14-502B1B8F4095}" dt="2022-05-25T02:19:23.100" v="8212" actId="20577"/>
           <ac:spMkLst>
             <pc:docMk/>
             <pc:sldMk cId="3838895173" sldId="258"/>
@@ -3423,7 +3423,7 @@
         </pc:spChg>
       </pc:sldChg>
       <pc:sldChg chg="addSp delSp modSp mod">
-        <pc:chgData name="Molly Sankey" userId="944469c7-6883-451f-9b55-4524bc4915b3" providerId="ADAL" clId="{F1BAABD6-565A-4B4D-9F14-502B1B8F4095}" dt="2022-05-09T21:10:13.709" v="2433" actId="1076"/>
+        <pc:chgData name="Molly Sankey" userId="944469c7-6883-451f-9b55-4524bc4915b3" providerId="ADAL" clId="{F1BAABD6-565A-4B4D-9F14-502B1B8F4095}" dt="2022-05-25T23:57:19.208" v="8832" actId="1076"/>
         <pc:sldMkLst>
           <pc:docMk/>
           <pc:sldMk cId="3760331451" sldId="260"/>
@@ -3445,7 +3445,7 @@
           </ac:picMkLst>
         </pc:picChg>
         <pc:picChg chg="add mod">
-          <ac:chgData name="Molly Sankey" userId="944469c7-6883-451f-9b55-4524bc4915b3" providerId="ADAL" clId="{F1BAABD6-565A-4B4D-9F14-502B1B8F4095}" dt="2022-05-09T21:10:13.709" v="2433" actId="1076"/>
+          <ac:chgData name="Molly Sankey" userId="944469c7-6883-451f-9b55-4524bc4915b3" providerId="ADAL" clId="{F1BAABD6-565A-4B4D-9F14-502B1B8F4095}" dt="2022-05-25T23:57:19.208" v="8832" actId="1076"/>
           <ac:picMkLst>
             <pc:docMk/>
             <pc:sldMk cId="3760331451" sldId="260"/>
@@ -6723,8 +6723,8 @@
           </ac:inkMkLst>
         </pc:inkChg>
       </pc:sldChg>
-      <pc:sldChg chg="delSp modSp add mod">
-        <pc:chgData name="Molly Sankey" userId="944469c7-6883-451f-9b55-4524bc4915b3" providerId="ADAL" clId="{F1BAABD6-565A-4B4D-9F14-502B1B8F4095}" dt="2022-05-25T01:45:05.022" v="6695" actId="20577"/>
+      <pc:sldChg chg="addSp delSp modSp add mod">
+        <pc:chgData name="Molly Sankey" userId="944469c7-6883-451f-9b55-4524bc4915b3" providerId="ADAL" clId="{F1BAABD6-565A-4B4D-9F14-502B1B8F4095}" dt="2022-05-25T23:57:56.036" v="8838" actId="1076"/>
         <pc:sldMkLst>
           <pc:docMk/>
           <pc:sldMk cId="4133279710" sldId="310"/>
@@ -6737,12 +6737,36 @@
             <ac:spMk id="2" creationId="{D62183D5-E1F8-4917-B0BA-FC2E62047445}"/>
           </ac:spMkLst>
         </pc:spChg>
+        <pc:spChg chg="add mod">
+          <ac:chgData name="Molly Sankey" userId="944469c7-6883-451f-9b55-4524bc4915b3" providerId="ADAL" clId="{F1BAABD6-565A-4B4D-9F14-502B1B8F4095}" dt="2022-05-25T23:56:16.680" v="8828" actId="20577"/>
+          <ac:spMkLst>
+            <pc:docMk/>
+            <pc:sldMk cId="4133279710" sldId="310"/>
+            <ac:spMk id="3" creationId="{19FB17FB-0EC6-47CF-96D8-0B293598653D}"/>
+          </ac:spMkLst>
+        </pc:spChg>
+        <pc:spChg chg="add mod">
+          <ac:chgData name="Molly Sankey" userId="944469c7-6883-451f-9b55-4524bc4915b3" providerId="ADAL" clId="{F1BAABD6-565A-4B4D-9F14-502B1B8F4095}" dt="2022-05-25T23:57:56.036" v="8838" actId="1076"/>
+          <ac:spMkLst>
+            <pc:docMk/>
+            <pc:sldMk cId="4133279710" sldId="310"/>
+            <ac:spMk id="23" creationId="{B0825DC8-B87A-4E9C-9D2A-9089FEDB397F}"/>
+          </ac:spMkLst>
+        </pc:spChg>
         <pc:picChg chg="del">
           <ac:chgData name="Molly Sankey" userId="944469c7-6883-451f-9b55-4524bc4915b3" providerId="ADAL" clId="{F1BAABD6-565A-4B4D-9F14-502B1B8F4095}" dt="2022-05-25T01:44:19.590" v="6632" actId="478"/>
           <ac:picMkLst>
             <pc:docMk/>
             <pc:sldMk cId="4133279710" sldId="310"/>
             <ac:picMk id="4" creationId="{032BD2D3-FA73-4C09-9F9C-C61A42626432}"/>
+          </ac:picMkLst>
+        </pc:picChg>
+        <pc:picChg chg="add mod">
+          <ac:chgData name="Molly Sankey" userId="944469c7-6883-451f-9b55-4524bc4915b3" providerId="ADAL" clId="{F1BAABD6-565A-4B4D-9F14-502B1B8F4095}" dt="2022-05-25T23:53:33.670" v="8526" actId="14100"/>
+          <ac:picMkLst>
+            <pc:docMk/>
+            <pc:sldMk cId="4133279710" sldId="310"/>
+            <ac:picMk id="6" creationId="{3E043E90-E686-44DA-915A-56A25A4BFAF9}"/>
           </ac:picMkLst>
         </pc:picChg>
         <pc:picChg chg="del">
@@ -6751,6 +6775,14 @@
             <pc:docMk/>
             <pc:sldMk cId="4133279710" sldId="310"/>
             <ac:picMk id="8" creationId="{4A6E8168-B287-4387-9906-5225A8B08295}"/>
+          </ac:picMkLst>
+        </pc:picChg>
+        <pc:picChg chg="add mod">
+          <ac:chgData name="Molly Sankey" userId="944469c7-6883-451f-9b55-4524bc4915b3" providerId="ADAL" clId="{F1BAABD6-565A-4B4D-9F14-502B1B8F4095}" dt="2022-05-25T23:57:51.663" v="8837" actId="14100"/>
+          <ac:picMkLst>
+            <pc:docMk/>
+            <pc:sldMk cId="4133279710" sldId="310"/>
+            <ac:picMk id="9" creationId="{2BAEF07C-B671-45B5-89F4-19C814EF21DD}"/>
           </ac:picMkLst>
         </pc:picChg>
         <pc:picChg chg="del">
@@ -6769,6 +6801,22 @@
             <ac:picMk id="12" creationId="{9A1FFEFD-9A9F-494E-9A2B-3C9F19FEAC20}"/>
           </ac:picMkLst>
         </pc:picChg>
+        <pc:inkChg chg="add del">
+          <ac:chgData name="Molly Sankey" userId="944469c7-6883-451f-9b55-4524bc4915b3" providerId="ADAL" clId="{F1BAABD6-565A-4B4D-9F14-502B1B8F4095}" dt="2022-05-25T23:57:36.008" v="8834" actId="9405"/>
+          <ac:inkMkLst>
+            <pc:docMk/>
+            <pc:sldMk cId="4133279710" sldId="310"/>
+            <ac:inkMk id="11" creationId="{E4116341-2227-4CEE-BD9D-114B234DFB94}"/>
+          </ac:inkMkLst>
+        </pc:inkChg>
+        <pc:inkChg chg="add del">
+          <ac:chgData name="Molly Sankey" userId="944469c7-6883-451f-9b55-4524bc4915b3" providerId="ADAL" clId="{F1BAABD6-565A-4B4D-9F14-502B1B8F4095}" dt="2022-05-25T23:57:45.702" v="8836" actId="34122"/>
+          <ac:inkMkLst>
+            <pc:docMk/>
+            <pc:sldMk cId="4133279710" sldId="310"/>
+            <ac:inkMk id="13" creationId="{8E19B01D-2F9D-4C3E-BC12-FF98D61F8465}"/>
+          </ac:inkMkLst>
+        </pc:inkChg>
       </pc:sldChg>
     </pc:docChg>
   </pc:docChgLst>
@@ -22138,32 +22186,24 @@
                   <a:srgbClr val="274E13"/>
                 </a:solidFill>
               </a:rPr>
-              <a:t>Link to final version of your </a:t>
+              <a:t>Link to final version of your program: </a:t>
             </a:r>
             <a:r>
-              <a:rPr lang="en-NZ" sz="2000" b="1">
-                <a:solidFill>
-                  <a:srgbClr val="274E13"/>
-                </a:solidFill>
-              </a:rPr>
-              <a:t>program: </a:t>
-            </a:r>
-            <a:r>
-              <a:rPr lang="en-NZ" sz="2000" b="1">
+              <a:rPr lang="en-NZ" sz="2000" b="1" dirty="0">
                 <a:solidFill>
                   <a:srgbClr val="274E13"/>
                 </a:solidFill>
                 <a:hlinkClick r:id="rId4"/>
               </a:rPr>
-              <a:t>https://github.com/MOLLY-S1/Assessment/commit/c31fd114821ce419191d351dbbf415c88d2ec27f</a:t>
+              <a:t>https://github.com/MOLLY-S1/Assessment/commit/f2f38fd020cdef66e2f48757b8d04161ed833f98</a:t>
             </a:r>
             <a:r>
-              <a:rPr lang="en-NZ" sz="2000" b="1">
+              <a:rPr lang="en-NZ" sz="2000" b="1" dirty="0">
                 <a:solidFill>
                   <a:srgbClr val="274E13"/>
                 </a:solidFill>
               </a:rPr>
-              <a:t> </a:t>
+              <a:t>  </a:t>
             </a:r>
             <a:endParaRPr lang="en-NZ" sz="2000" dirty="0"/>
           </a:p>
@@ -28570,6 +28610,226 @@
           </a:p>
         </p:txBody>
       </p:sp>
+      <p:sp>
+        <p:nvSpPr>
+          <p:cNvPr id="3" name="TextBox 2">
+            <a:extLst>
+              <a:ext uri="{FF2B5EF4-FFF2-40B4-BE49-F238E27FC236}">
+                <a16:creationId xmlns:a16="http://schemas.microsoft.com/office/drawing/2014/main" id="{19FB17FB-0EC6-47CF-96D8-0B293598653D}"/>
+              </a:ext>
+            </a:extLst>
+          </p:cNvPr>
+          <p:cNvSpPr txBox="1"/>
+          <p:nvPr/>
+        </p:nvSpPr>
+        <p:spPr>
+          <a:xfrm>
+            <a:off x="670560" y="999173"/>
+            <a:ext cx="10850880" cy="4893647"/>
+          </a:xfrm>
+          <a:prstGeom prst="rect">
+            <a:avLst/>
+          </a:prstGeom>
+          <a:noFill/>
+        </p:spPr>
+        <p:txBody>
+          <a:bodyPr wrap="square" rtlCol="0">
+            <a:spAutoFit/>
+          </a:bodyPr>
+          <a:lstStyle/>
+          <a:p>
+            <a:r>
+              <a:rPr lang="en-NZ" sz="2400" b="1" u="sng" dirty="0"/>
+              <a:t>When talking with users about my final problems there was a few problems found:</a:t>
+            </a:r>
+            <a:endParaRPr lang="en-NZ" sz="2400" dirty="0"/>
+          </a:p>
+          <a:p>
+            <a:pPr marL="342900" indent="-342900">
+              <a:buFontTx/>
+              <a:buChar char="-"/>
+            </a:pPr>
+            <a:r>
+              <a:rPr lang="en-NZ" sz="2400" dirty="0"/>
+              <a:t>The questions did not reset from 0 when a new round was played. I have now fixed this by adding two lines of code:</a:t>
+            </a:r>
+          </a:p>
+          <a:p>
+            <a:pPr marL="342900" indent="-342900">
+              <a:buFontTx/>
+              <a:buChar char="-"/>
+            </a:pPr>
+            <a:endParaRPr lang="en-NZ" sz="2400" dirty="0"/>
+          </a:p>
+          <a:p>
+            <a:pPr marL="342900" indent="-342900">
+              <a:buFontTx/>
+              <a:buChar char="-"/>
+            </a:pPr>
+            <a:endParaRPr lang="en-NZ" sz="2400" dirty="0"/>
+          </a:p>
+          <a:p>
+            <a:pPr marL="342900" indent="-342900">
+              <a:buFontTx/>
+              <a:buChar char="-"/>
+            </a:pPr>
+            <a:endParaRPr lang="en-NZ" sz="2400" dirty="0"/>
+          </a:p>
+          <a:p>
+            <a:pPr marL="342900" indent="-342900">
+              <a:buFontTx/>
+              <a:buChar char="-"/>
+            </a:pPr>
+            <a:endParaRPr lang="en-NZ" sz="2400" dirty="0"/>
+          </a:p>
+          <a:p>
+            <a:pPr marL="342900" indent="-342900">
+              <a:buFontTx/>
+              <a:buChar char="-"/>
+            </a:pPr>
+            <a:r>
+              <a:rPr lang="en-NZ" sz="2400" dirty="0"/>
+              <a:t>When a new round is wanting to  be played the code previously stated that “press &lt;enter&gt; to play again but if any thing except ‘x’ will play another round. This has now been changed to show that any key can be entered to play again.</a:t>
+            </a:r>
+          </a:p>
+          <a:p>
+            <a:pPr marL="342900" indent="-342900">
+              <a:buFontTx/>
+              <a:buChar char="-"/>
+            </a:pPr>
+            <a:endParaRPr lang="en-NZ" sz="2400" dirty="0"/>
+          </a:p>
+          <a:p>
+            <a:pPr marL="342900" indent="-342900">
+              <a:buFontTx/>
+              <a:buChar char="-"/>
+            </a:pPr>
+            <a:endParaRPr lang="en-NZ" sz="2400" dirty="0"/>
+          </a:p>
+          <a:p>
+            <a:endParaRPr lang="en-NZ" sz="2400" dirty="0"/>
+          </a:p>
+        </p:txBody>
+      </p:sp>
+      <p:pic>
+        <p:nvPicPr>
+          <p:cNvPr id="6" name="Picture 5">
+            <a:extLst>
+              <a:ext uri="{FF2B5EF4-FFF2-40B4-BE49-F238E27FC236}">
+                <a16:creationId xmlns:a16="http://schemas.microsoft.com/office/drawing/2014/main" id="{3E043E90-E686-44DA-915A-56A25A4BFAF9}"/>
+              </a:ext>
+            </a:extLst>
+          </p:cNvPr>
+          <p:cNvPicPr>
+            <a:picLocks noChangeAspect="1"/>
+          </p:cNvPicPr>
+          <p:nvPr/>
+        </p:nvPicPr>
+        <p:blipFill>
+          <a:blip r:embed="rId3"/>
+          <a:stretch>
+            <a:fillRect/>
+          </a:stretch>
+        </p:blipFill>
+        <p:spPr>
+          <a:xfrm>
+            <a:off x="1088960" y="2250272"/>
+            <a:ext cx="3513519" cy="1099651"/>
+          </a:xfrm>
+          <a:prstGeom prst="rect">
+            <a:avLst/>
+          </a:prstGeom>
+        </p:spPr>
+      </p:pic>
+      <p:pic>
+        <p:nvPicPr>
+          <p:cNvPr id="9" name="Picture 8">
+            <a:extLst>
+              <a:ext uri="{FF2B5EF4-FFF2-40B4-BE49-F238E27FC236}">
+                <a16:creationId xmlns:a16="http://schemas.microsoft.com/office/drawing/2014/main" id="{2BAEF07C-B671-45B5-89F4-19C814EF21DD}"/>
+              </a:ext>
+            </a:extLst>
+          </p:cNvPr>
+          <p:cNvPicPr>
+            <a:picLocks noChangeAspect="1"/>
+          </p:cNvPicPr>
+          <p:nvPr/>
+        </p:nvPicPr>
+        <p:blipFill>
+          <a:blip r:embed="rId4"/>
+          <a:stretch>
+            <a:fillRect/>
+          </a:stretch>
+        </p:blipFill>
+        <p:spPr>
+          <a:xfrm>
+            <a:off x="838199" y="4768190"/>
+            <a:ext cx="7366150" cy="1515379"/>
+          </a:xfrm>
+          <a:prstGeom prst="rect">
+            <a:avLst/>
+          </a:prstGeom>
+        </p:spPr>
+      </p:pic>
+      <p:sp>
+        <p:nvSpPr>
+          <p:cNvPr id="23" name="Rectangle 22">
+            <a:extLst>
+              <a:ext uri="{FF2B5EF4-FFF2-40B4-BE49-F238E27FC236}">
+                <a16:creationId xmlns:a16="http://schemas.microsoft.com/office/drawing/2014/main" id="{B0825DC8-B87A-4E9C-9D2A-9089FEDB397F}"/>
+              </a:ext>
+            </a:extLst>
+          </p:cNvPr>
+          <p:cNvSpPr/>
+          <p:nvPr/>
+        </p:nvSpPr>
+        <p:spPr>
+          <a:xfrm>
+            <a:off x="4070256" y="5531221"/>
+            <a:ext cx="365760" cy="182880"/>
+          </a:xfrm>
+          <a:prstGeom prst="rect">
+            <a:avLst/>
+          </a:prstGeom>
+          <a:solidFill>
+            <a:srgbClr val="FFC114">
+              <a:alpha val="5000"/>
+            </a:srgbClr>
+          </a:solidFill>
+          <a:ln w="72000">
+            <a:solidFill>
+              <a:srgbClr val="FFC114"/>
+            </a:solidFill>
+          </a:ln>
+        </p:spPr>
+        <p:style>
+          <a:lnRef idx="2">
+            <a:schemeClr val="accent1">
+              <a:shade val="50000"/>
+            </a:schemeClr>
+          </a:lnRef>
+          <a:fillRef idx="1">
+            <a:schemeClr val="accent1"/>
+          </a:fillRef>
+          <a:effectRef idx="0">
+            <a:schemeClr val="accent1"/>
+          </a:effectRef>
+          <a:fontRef idx="minor">
+            <a:schemeClr val="lt1"/>
+          </a:fontRef>
+        </p:style>
+        <p:txBody>
+          <a:bodyPr wrap="none" rtlCol="0" anchor="ctr" anchorCtr="1"/>
+          <a:lstStyle/>
+          <a:p>
+            <a:endParaRPr lang="ko-KR" altLang="en-US">
+              <a:solidFill>
+                <a:srgbClr val="FFC114"/>
+              </a:solidFill>
+            </a:endParaRPr>
+          </a:p>
+        </p:txBody>
+      </p:sp>
     </p:spTree>
     <p:extLst>
       <p:ext uri="{BB962C8B-B14F-4D97-AF65-F5344CB8AC3E}">
@@ -29356,7 +29616,7 @@
         </p:blipFill>
         <p:spPr>
           <a:xfrm>
-            <a:off x="3886130" y="1100719"/>
+            <a:off x="756850" y="965200"/>
             <a:ext cx="3479869" cy="5392156"/>
           </a:xfrm>
           <a:prstGeom prst="rect">

</xml_diff>